<commit_message>
Update Proyectos Funcion Cultura y Social.pptx
</commit_message>
<xml_diff>
--- a/Proyectos Funcion Cultura y Social.pptx
+++ b/Proyectos Funcion Cultura y Social.pptx
@@ -9,7 +9,7 @@
   </p:notesMasterIdLst>
   <p:sldIdLst>
     <p:sldId id="256" r:id="rId2"/>
-    <p:sldId id="266" r:id="rId3"/>
+    <p:sldId id="267" r:id="rId3"/>
     <p:sldId id="257" r:id="rId4"/>
   </p:sldIdLst>
   <p:sldSz cx="9144000" cy="5143500" type="screen16x9"/>
@@ -3592,12 +3592,75 @@
           <a:chExt cx="0" cy="0"/>
         </a:xfrm>
       </p:grpSpPr>
+      <p:sp>
+        <p:nvSpPr>
+          <p:cNvPr id="2" name="Título 1">
+            <a:extLst>
+              <a:ext uri="{FF2B5EF4-FFF2-40B4-BE49-F238E27FC236}">
+                <a16:creationId xmlns:a16="http://schemas.microsoft.com/office/drawing/2014/main" id="{4DB900D7-66BE-4F01-8971-02E9870F808B}"/>
+              </a:ext>
+            </a:extLst>
+          </p:cNvPr>
+          <p:cNvSpPr>
+            <a:spLocks noGrp="1"/>
+          </p:cNvSpPr>
+          <p:nvPr>
+            <p:ph type="title"/>
+          </p:nvPr>
+        </p:nvSpPr>
+        <p:spPr/>
+        <p:txBody>
+          <a:bodyPr/>
+          <a:lstStyle/>
+          <a:p>
+            <a:endParaRPr lang="es-PE"/>
+          </a:p>
+        </p:txBody>
+      </p:sp>
+      <p:sp>
+        <p:nvSpPr>
+          <p:cNvPr id="5" name="Marcador de número de diapositiva 4">
+            <a:extLst>
+              <a:ext uri="{FF2B5EF4-FFF2-40B4-BE49-F238E27FC236}">
+                <a16:creationId xmlns:a16="http://schemas.microsoft.com/office/drawing/2014/main" id="{AD5BBCA9-716D-4028-9AE4-7CC5CA707E9D}"/>
+              </a:ext>
+            </a:extLst>
+          </p:cNvPr>
+          <p:cNvSpPr>
+            <a:spLocks noGrp="1"/>
+          </p:cNvSpPr>
+          <p:nvPr>
+            <p:ph type="sldNum" idx="12"/>
+          </p:nvPr>
+        </p:nvSpPr>
+        <p:spPr/>
+        <p:txBody>
+          <a:bodyPr/>
+          <a:lstStyle/>
+          <a:p>
+            <a:pPr marL="0" lvl="0" indent="0" algn="r" rtl="0">
+              <a:spcBef>
+                <a:spcPts val="0"/>
+              </a:spcBef>
+              <a:spcAft>
+                <a:spcPts val="0"/>
+              </a:spcAft>
+              <a:buNone/>
+            </a:pPr>
+            <a:fld id="{00000000-1234-1234-1234-123412341234}" type="slidenum">
+              <a:rPr lang="es-PE" smtClean="0"/>
+              <a:t>2</a:t>
+            </a:fld>
+            <a:endParaRPr lang="es-PE"/>
+          </a:p>
+        </p:txBody>
+      </p:sp>
       <p:graphicFrame>
         <p:nvGraphicFramePr>
-          <p:cNvPr id="4" name="Tabla 6">
+          <p:cNvPr id="7" name="Tabla 6">
             <a:extLst>
               <a:ext uri="{FF2B5EF4-FFF2-40B4-BE49-F238E27FC236}">
-                <a16:creationId xmlns:a16="http://schemas.microsoft.com/office/drawing/2014/main" id="{61092F70-2AE1-4B21-990C-2413397B307E}"/>
+                <a16:creationId xmlns:a16="http://schemas.microsoft.com/office/drawing/2014/main" id="{4D592AF4-7563-4CC1-8123-D17625144AE6}"/>
               </a:ext>
             </a:extLst>
           </p:cNvPr>
@@ -3607,7 +3670,7 @@
           <p:nvPr>
             <p:extLst>
               <p:ext uri="{D42A27DB-BD31-4B8C-83A1-F6EECF244321}">
-                <p14:modId xmlns:p14="http://schemas.microsoft.com/office/powerpoint/2010/main" val="1359984890"/>
+                <p14:modId xmlns:p14="http://schemas.microsoft.com/office/powerpoint/2010/main" val="3576689541"/>
               </p:ext>
             </p:extLst>
           </p:nvPr>
@@ -4369,10 +4432,10 @@
       </p:graphicFrame>
       <p:sp>
         <p:nvSpPr>
-          <p:cNvPr id="5" name="Google Shape;95;p13">
+          <p:cNvPr id="9" name="Google Shape;95;p13">
             <a:extLst>
               <a:ext uri="{FF2B5EF4-FFF2-40B4-BE49-F238E27FC236}">
-                <a16:creationId xmlns:a16="http://schemas.microsoft.com/office/drawing/2014/main" id="{7DB9BA98-6BEB-4F68-8F37-ADE0EF83B1E6}"/>
+                <a16:creationId xmlns:a16="http://schemas.microsoft.com/office/drawing/2014/main" id="{8E7D8978-A4A5-425B-9193-C1A3CF071584}"/>
               </a:ext>
             </a:extLst>
           </p:cNvPr>
@@ -4665,7 +4728,7 @@
     </p:spTree>
     <p:extLst>
       <p:ext uri="{BB962C8B-B14F-4D97-AF65-F5344CB8AC3E}">
-        <p14:creationId xmlns:p14="http://schemas.microsoft.com/office/powerpoint/2010/main" val="2737772133"/>
+        <p14:creationId xmlns:p14="http://schemas.microsoft.com/office/powerpoint/2010/main" val="4180027212"/>
       </p:ext>
     </p:extLst>
   </p:cSld>

</xml_diff>